<commit_message>
Update Document : Weekly Report (1)
</commit_message>
<xml_diff>
--- a/Documents/Weekly_Report/Week_1/[1차] 진행 계획.pptx
+++ b/Documents/Weekly_Report/Week_1/[1차] 진행 계획.pptx
@@ -113,6 +113,11 @@
       </a:defRPr>
     </a:lvl9pPr>
   </p:defaultTextStyle>
+  <p:extLst>
+    <p:ext uri="{EFAFB233-063F-42B5-8137-9DF3F51BA10A}">
+      <p15:sldGuideLst xmlns:p15="http://schemas.microsoft.com/office/powerpoint/2012/main"/>
+    </p:ext>
+  </p:extLst>
 </p:presentation>
 </file>
 
@@ -323,7 +328,7 @@
           <a:p>
             <a:fld id="{F6C9C170-5B8D-4AD8-BD7A-E3CFB0C90E9F}" type="datetimeFigureOut">
               <a:rPr lang="ko-KR" altLang="en-US" smtClean="0"/>
-              <a:t>2020-09-03</a:t>
+              <a:t>2020-09-04</a:t>
             </a:fld>
             <a:endParaRPr lang="ko-KR" altLang="en-US"/>
           </a:p>
@@ -515,7 +520,7 @@
           <a:p>
             <a:fld id="{F6C9C170-5B8D-4AD8-BD7A-E3CFB0C90E9F}" type="datetimeFigureOut">
               <a:rPr lang="ko-KR" altLang="en-US" smtClean="0"/>
-              <a:t>2020-09-03</a:t>
+              <a:t>2020-09-04</a:t>
             </a:fld>
             <a:endParaRPr lang="ko-KR" altLang="en-US"/>
           </a:p>
@@ -695,7 +700,7 @@
           <a:p>
             <a:fld id="{F6C9C170-5B8D-4AD8-BD7A-E3CFB0C90E9F}" type="datetimeFigureOut">
               <a:rPr lang="ko-KR" altLang="en-US" smtClean="0"/>
-              <a:t>2020-09-03</a:t>
+              <a:t>2020-09-04</a:t>
             </a:fld>
             <a:endParaRPr lang="ko-KR" altLang="en-US"/>
           </a:p>
@@ -865,7 +870,7 @@
           <a:p>
             <a:fld id="{F6C9C170-5B8D-4AD8-BD7A-E3CFB0C90E9F}" type="datetimeFigureOut">
               <a:rPr lang="ko-KR" altLang="en-US" smtClean="0"/>
-              <a:t>2020-09-03</a:t>
+              <a:t>2020-09-04</a:t>
             </a:fld>
             <a:endParaRPr lang="ko-KR" altLang="en-US"/>
           </a:p>
@@ -1119,7 +1124,7 @@
           <a:p>
             <a:fld id="{F6C9C170-5B8D-4AD8-BD7A-E3CFB0C90E9F}" type="datetimeFigureOut">
               <a:rPr lang="ko-KR" altLang="en-US" smtClean="0"/>
-              <a:t>2020-09-03</a:t>
+              <a:t>2020-09-04</a:t>
             </a:fld>
             <a:endParaRPr lang="ko-KR" altLang="en-US"/>
           </a:p>
@@ -1445,7 +1450,7 @@
           <a:p>
             <a:fld id="{F6C9C170-5B8D-4AD8-BD7A-E3CFB0C90E9F}" type="datetimeFigureOut">
               <a:rPr lang="ko-KR" altLang="en-US" smtClean="0"/>
-              <a:t>2020-09-03</a:t>
+              <a:t>2020-09-04</a:t>
             </a:fld>
             <a:endParaRPr lang="ko-KR" altLang="en-US"/>
           </a:p>
@@ -1865,7 +1870,7 @@
           <a:p>
             <a:fld id="{F6C9C170-5B8D-4AD8-BD7A-E3CFB0C90E9F}" type="datetimeFigureOut">
               <a:rPr lang="ko-KR" altLang="en-US" smtClean="0"/>
-              <a:t>2020-09-03</a:t>
+              <a:t>2020-09-04</a:t>
             </a:fld>
             <a:endParaRPr lang="ko-KR" altLang="en-US"/>
           </a:p>
@@ -1983,7 +1988,7 @@
           <a:p>
             <a:fld id="{F6C9C170-5B8D-4AD8-BD7A-E3CFB0C90E9F}" type="datetimeFigureOut">
               <a:rPr lang="ko-KR" altLang="en-US" smtClean="0"/>
-              <a:t>2020-09-03</a:t>
+              <a:t>2020-09-04</a:t>
             </a:fld>
             <a:endParaRPr lang="ko-KR" altLang="en-US"/>
           </a:p>
@@ -2078,7 +2083,7 @@
           <a:p>
             <a:fld id="{F6C9C170-5B8D-4AD8-BD7A-E3CFB0C90E9F}" type="datetimeFigureOut">
               <a:rPr lang="ko-KR" altLang="en-US" smtClean="0"/>
-              <a:t>2020-09-03</a:t>
+              <a:t>2020-09-04</a:t>
             </a:fld>
             <a:endParaRPr lang="ko-KR" altLang="en-US"/>
           </a:p>
@@ -2365,7 +2370,7 @@
           <a:p>
             <a:fld id="{F6C9C170-5B8D-4AD8-BD7A-E3CFB0C90E9F}" type="datetimeFigureOut">
               <a:rPr lang="ko-KR" altLang="en-US" smtClean="0"/>
-              <a:t>2020-09-03</a:t>
+              <a:t>2020-09-04</a:t>
             </a:fld>
             <a:endParaRPr lang="ko-KR" altLang="en-US"/>
           </a:p>
@@ -2687,7 +2692,7 @@
           <a:p>
             <a:fld id="{F6C9C170-5B8D-4AD8-BD7A-E3CFB0C90E9F}" type="datetimeFigureOut">
               <a:rPr lang="ko-KR" altLang="en-US" smtClean="0"/>
-              <a:t>2020-09-03</a:t>
+              <a:t>2020-09-04</a:t>
             </a:fld>
             <a:endParaRPr lang="ko-KR" altLang="en-US"/>
           </a:p>
@@ -2941,7 +2946,7 @@
           <a:p>
             <a:fld id="{F6C9C170-5B8D-4AD8-BD7A-E3CFB0C90E9F}" type="datetimeFigureOut">
               <a:rPr lang="ko-KR" altLang="en-US" smtClean="0"/>
-              <a:t>2020-09-03</a:t>
+              <a:t>2020-09-04</a:t>
             </a:fld>
             <a:endParaRPr lang="ko-KR" altLang="en-US"/>
           </a:p>
@@ -3851,7 +3856,7 @@
         <p:spPr/>
         <p:txBody>
           <a:bodyPr>
-            <a:normAutofit fontScale="92500" lnSpcReduction="20000"/>
+            <a:normAutofit/>
           </a:bodyPr>
           <a:lstStyle/>
           <a:p>
@@ -3918,116 +3923,120 @@
               <a:buNone/>
             </a:pPr>
             <a:r>
-              <a:rPr lang="en-US" altLang="ko-KR" dirty="0" smtClean="0"/>
+              <a:rPr lang="en-US" altLang="ko-KR" sz="1400" dirty="0" smtClean="0"/>
               <a:t>1. </a:t>
             </a:r>
             <a:r>
-              <a:rPr lang="ko-KR" altLang="en-US" dirty="0" smtClean="0"/>
-              <a:t>학습 </a:t>
-            </a:r>
-            <a:r>
-              <a:rPr lang="en-US" altLang="ko-KR" dirty="0" smtClean="0"/>
-              <a:t>-</a:t>
-            </a:r>
-            <a:r>
-              <a:rPr lang="ko-KR" altLang="en-US" dirty="0" smtClean="0"/>
-              <a:t> 각자 진행 후 서로의 진행 상황 확인</a:t>
-            </a:r>
-            <a:r>
-              <a:rPr lang="en-US" altLang="ko-KR" dirty="0" smtClean="0"/>
+              <a:rPr lang="ko-KR" altLang="en-US" sz="1400" dirty="0" smtClean="0"/>
+              <a:t>학습</a:t>
+            </a:r>
+            <a:r>
+              <a:rPr lang="en-US" altLang="ko-KR" sz="1400" dirty="0" smtClean="0"/>
+              <a:t> - </a:t>
+            </a:r>
+            <a:r>
+              <a:rPr lang="ko-KR" altLang="en-US" sz="1400" dirty="0" smtClean="0"/>
+              <a:t>각자 </a:t>
+            </a:r>
+            <a:r>
+              <a:rPr lang="ko-KR" altLang="en-US" sz="1400" dirty="0" smtClean="0"/>
+              <a:t>진행 후 서로의 진행 상황 확인</a:t>
+            </a:r>
+            <a:r>
+              <a:rPr lang="en-US" altLang="ko-KR" sz="1400" dirty="0" smtClean="0"/>
               <a:t>, </a:t>
             </a:r>
             <a:r>
-              <a:rPr lang="ko-KR" altLang="en-US" dirty="0" smtClean="0"/>
+              <a:rPr lang="ko-KR" altLang="en-US" sz="1400" dirty="0" smtClean="0"/>
               <a:t>질문</a:t>
             </a:r>
-            <a:endParaRPr lang="en-US" altLang="ko-KR" dirty="0"/>
+            <a:endParaRPr lang="en-US" altLang="ko-KR" sz="1400" dirty="0"/>
           </a:p>
           <a:p>
             <a:pPr marL="0" indent="0">
               <a:buNone/>
             </a:pPr>
             <a:r>
-              <a:rPr lang="en-US" altLang="ko-KR" dirty="0" smtClean="0"/>
+              <a:rPr lang="en-US" altLang="ko-KR" sz="1400" dirty="0" smtClean="0"/>
               <a:t>2. </a:t>
             </a:r>
             <a:r>
-              <a:rPr lang="ko-KR" altLang="en-US" dirty="0" smtClean="0"/>
+              <a:rPr lang="ko-KR" altLang="en-US" sz="1400" dirty="0" smtClean="0"/>
               <a:t>설계 </a:t>
             </a:r>
             <a:r>
-              <a:rPr lang="en-US" altLang="ko-KR" dirty="0" smtClean="0"/>
+              <a:rPr lang="en-US" altLang="ko-KR" sz="1400" dirty="0" smtClean="0"/>
               <a:t>- </a:t>
             </a:r>
             <a:r>
-              <a:rPr lang="ko-KR" altLang="en-US" dirty="0" smtClean="0"/>
+              <a:rPr lang="ko-KR" altLang="en-US" sz="1400" dirty="0" smtClean="0"/>
               <a:t> 화상 회의를 통해 함께 진행</a:t>
             </a:r>
-            <a:endParaRPr lang="en-US" altLang="ko-KR" dirty="0" smtClean="0"/>
+            <a:endParaRPr lang="en-US" altLang="ko-KR" sz="1400" dirty="0" smtClean="0"/>
           </a:p>
           <a:p>
             <a:pPr marL="0" indent="0">
               <a:buNone/>
             </a:pPr>
             <a:r>
-              <a:rPr lang="en-US" altLang="ko-KR" dirty="0" smtClean="0"/>
+              <a:rPr lang="en-US" altLang="ko-KR" sz="1400" dirty="0" smtClean="0"/>
               <a:t>3. </a:t>
             </a:r>
             <a:r>
-              <a:rPr lang="ko-KR" altLang="en-US" dirty="0" smtClean="0"/>
+              <a:rPr lang="ko-KR" altLang="en-US" sz="1400" dirty="0" smtClean="0"/>
               <a:t>구현 </a:t>
             </a:r>
             <a:r>
-              <a:rPr lang="en-US" altLang="ko-KR" dirty="0" smtClean="0"/>
+              <a:rPr lang="en-US" altLang="ko-KR" sz="1400" dirty="0" smtClean="0"/>
               <a:t>- </a:t>
             </a:r>
             <a:r>
-              <a:rPr lang="ko-KR" altLang="en-US" dirty="0" smtClean="0"/>
+              <a:rPr lang="ko-KR" altLang="en-US" sz="1400" dirty="0" smtClean="0"/>
               <a:t>각자 맡은 파트 진행 후 </a:t>
             </a:r>
             <a:r>
-              <a:rPr lang="en-US" altLang="ko-KR" dirty="0" err="1" smtClean="0"/>
+              <a:rPr lang="en-US" altLang="ko-KR" sz="1400" dirty="0" err="1" smtClean="0"/>
               <a:t>Github</a:t>
             </a:r>
             <a:r>
-              <a:rPr lang="ko-KR" altLang="en-US" dirty="0" smtClean="0"/>
+              <a:rPr lang="ko-KR" altLang="en-US" sz="1400" dirty="0" smtClean="0"/>
               <a:t>를 통해 진행 상황 확인 및 버전 관리</a:t>
             </a:r>
-            <a:endParaRPr lang="en-US" altLang="ko-KR" dirty="0" smtClean="0"/>
+            <a:endParaRPr lang="en-US" altLang="ko-KR" sz="1400" dirty="0" smtClean="0"/>
           </a:p>
           <a:p>
             <a:pPr marL="0" indent="0">
               <a:buNone/>
             </a:pPr>
             <a:r>
-              <a:rPr lang="en-US" altLang="ko-KR" dirty="0" smtClean="0"/>
+              <a:rPr lang="en-US" altLang="ko-KR" sz="1400" dirty="0" smtClean="0"/>
               <a:t>4. </a:t>
             </a:r>
             <a:r>
-              <a:rPr lang="ko-KR" altLang="en-US" dirty="0" smtClean="0"/>
+              <a:rPr lang="ko-KR" altLang="en-US" sz="1400" dirty="0" smtClean="0"/>
               <a:t>유지</a:t>
             </a:r>
             <a:r>
-              <a:rPr lang="en-US" altLang="ko-KR" dirty="0" smtClean="0"/>
+              <a:rPr lang="en-US" altLang="ko-KR" sz="1400" dirty="0" smtClean="0"/>
               <a:t>&amp;</a:t>
             </a:r>
             <a:r>
-              <a:rPr lang="ko-KR" altLang="en-US" dirty="0" smtClean="0"/>
+              <a:rPr lang="ko-KR" altLang="en-US" sz="1400" dirty="0" smtClean="0"/>
               <a:t>보수 </a:t>
             </a:r>
             <a:r>
-              <a:rPr lang="en-US" altLang="ko-KR" dirty="0"/>
+              <a:rPr lang="en-US" altLang="ko-KR" sz="1400" dirty="0"/>
               <a:t>-</a:t>
             </a:r>
             <a:r>
-              <a:rPr lang="en-US" altLang="ko-KR" dirty="0" smtClean="0"/>
+              <a:rPr lang="en-US" altLang="ko-KR" sz="1400" dirty="0" smtClean="0"/>
               <a:t> </a:t>
             </a:r>
             <a:r>
-              <a:rPr lang="ko-KR" altLang="en-US" dirty="0" smtClean="0"/>
+              <a:rPr lang="ko-KR" altLang="en-US" sz="1400" dirty="0" smtClean="0"/>
               <a:t>화상 회의를 통해 함께 테스트 케이스 작성 및 테스트 진행</a:t>
             </a:r>
-            <a:endParaRPr lang="en-US" altLang="ko-KR" dirty="0" smtClean="0"/>
+            <a:endParaRPr lang="en-US" altLang="ko-KR" sz="1400" dirty="0" smtClean="0"/>
           </a:p>
           <a:p>
             <a:endParaRPr lang="en-US" altLang="ko-KR" dirty="0"/>

</xml_diff>